<commit_message>
edit lecture 2 notebook.
</commit_message>
<xml_diff>
--- a/Presentations/02 Python变量和列表.pptx
+++ b/Presentations/02 Python变量和列表.pptx
@@ -33,16 +33,16 @@
   <p:notesSz cx="6858000" cy="9144000"/>
   <p:embeddedFontLst>
     <p:embeddedFont>
-      <p:font typeface="Roboto Slab" pitchFamily="2" charset="0"/>
+      <p:font typeface="Source Sans Pro" panose="020B0604020202020204" charset="0"/>
       <p:regular r:id="rId23"/>
       <p:bold r:id="rId24"/>
+      <p:italic r:id="rId25"/>
+      <p:boldItalic r:id="rId26"/>
     </p:embeddedFont>
     <p:embeddedFont>
-      <p:font typeface="Source Sans Pro" panose="020B0503030403020204" pitchFamily="34" charset="0"/>
-      <p:regular r:id="rId25"/>
-      <p:bold r:id="rId26"/>
-      <p:italic r:id="rId27"/>
-      <p:boldItalic r:id="rId28"/>
+      <p:font typeface="Roboto Slab" panose="020B0604020202020204" charset="0"/>
+      <p:regular r:id="rId27"/>
+      <p:bold r:id="rId28"/>
     </p:embeddedFont>
   </p:embeddedFontLst>
   <p:defaultTextStyle>
@@ -276,7 +276,7 @@
   </p:defaultTextStyle>
   <p:extLst>
     <p:ext uri="{EFAFB233-063F-42B5-8137-9DF3F51BA10A}">
-      <p15:sldGuideLst xmlns:p15="http://schemas.microsoft.com/office/powerpoint/2012/main">
+      <p15:sldGuideLst xmlns:p15="http://schemas.microsoft.com/office/powerpoint/2012/main" xmlns="">
         <p15:guide id="1" orient="horz" pos="2160">
           <p15:clr>
             <a:srgbClr val="A4A3A4"/>
@@ -1644,7 +1644,7 @@
           <a:p>
             <a:fld id="{581A783B-FA21-427C-BB1F-F00F1D0FC79B}" type="datetime1">
               <a:rPr lang="zh-CN" altLang="en-US" smtClean="0"/>
-              <a:t>2023/9/6</a:t>
+              <a:t>2024/2/29</a:t>
             </a:fld>
             <a:endParaRPr lang="en-US"/>
           </a:p>
@@ -3138,9 +3138,17 @@
               <a:rPr lang="zh-CN" altLang="en-US" sz="5400"/>
               <a:t>程序开发基础</a:t>
             </a:r>
+            <a:r>
+              <a:rPr lang="en-US" altLang="zh-CN" sz="5400"/>
+              <a:t/>
+            </a:r>
             <a:br>
               <a:rPr lang="en-US" altLang="zh-CN" sz="5400"/>
             </a:br>
+            <a:r>
+              <a:rPr lang="en-US" altLang="zh-CN" sz="5400"/>
+              <a:t/>
+            </a:r>
             <a:br>
               <a:rPr lang="en-US" altLang="zh-CN" sz="5400"/>
             </a:br>
@@ -4940,7 +4948,7 @@
         <p:spPr>
           <a:xfrm>
             <a:off x="251520" y="1412776"/>
-            <a:ext cx="7848872" cy="5112568"/>
+            <a:ext cx="8208912" cy="5112568"/>
           </a:xfrm>
         </p:spPr>
         <p:txBody>
@@ -5071,14 +5079,14 @@
                 <a:gridCol w="3048000">
                   <a:extLst>
                     <a:ext uri="{9D8B030D-6E8A-4147-A177-3AD203B41FA5}">
-                      <a16:colId xmlns:a16="http://schemas.microsoft.com/office/drawing/2014/main" val="20000"/>
+                      <a16:colId xmlns:a16="http://schemas.microsoft.com/office/drawing/2014/main" xmlns="" val="20000"/>
                     </a:ext>
                   </a:extLst>
                 </a:gridCol>
                 <a:gridCol w="3048000">
                   <a:extLst>
                     <a:ext uri="{9D8B030D-6E8A-4147-A177-3AD203B41FA5}">
-                      <a16:colId xmlns:a16="http://schemas.microsoft.com/office/drawing/2014/main" val="20001"/>
+                      <a16:colId xmlns:a16="http://schemas.microsoft.com/office/drawing/2014/main" xmlns="" val="20001"/>
                     </a:ext>
                   </a:extLst>
                 </a:gridCol>
@@ -5114,7 +5122,7 @@
                 </a:tc>
                 <a:extLst>
                   <a:ext uri="{0D108BD9-81ED-4DB2-BD59-A6C34878D82A}">
-                    <a16:rowId xmlns:a16="http://schemas.microsoft.com/office/drawing/2014/main" val="10000"/>
+                    <a16:rowId xmlns:a16="http://schemas.microsoft.com/office/drawing/2014/main" xmlns="" val="10000"/>
                   </a:ext>
                 </a:extLst>
               </a:tr>
@@ -5151,7 +5159,7 @@
                 </a:tc>
                 <a:extLst>
                   <a:ext uri="{0D108BD9-81ED-4DB2-BD59-A6C34878D82A}">
-                    <a16:rowId xmlns:a16="http://schemas.microsoft.com/office/drawing/2014/main" val="10001"/>
+                    <a16:rowId xmlns:a16="http://schemas.microsoft.com/office/drawing/2014/main" xmlns="" val="10001"/>
                   </a:ext>
                 </a:extLst>
               </a:tr>
@@ -5188,7 +5196,7 @@
                 </a:tc>
                 <a:extLst>
                   <a:ext uri="{0D108BD9-81ED-4DB2-BD59-A6C34878D82A}">
-                    <a16:rowId xmlns:a16="http://schemas.microsoft.com/office/drawing/2014/main" val="10002"/>
+                    <a16:rowId xmlns:a16="http://schemas.microsoft.com/office/drawing/2014/main" xmlns="" val="10002"/>
                   </a:ext>
                 </a:extLst>
               </a:tr>
@@ -5225,7 +5233,7 @@
                 </a:tc>
                 <a:extLst>
                   <a:ext uri="{0D108BD9-81ED-4DB2-BD59-A6C34878D82A}">
-                    <a16:rowId xmlns:a16="http://schemas.microsoft.com/office/drawing/2014/main" val="10003"/>
+                    <a16:rowId xmlns:a16="http://schemas.microsoft.com/office/drawing/2014/main" xmlns="" val="10003"/>
                   </a:ext>
                 </a:extLst>
               </a:tr>
@@ -5262,7 +5270,7 @@
                 </a:tc>
                 <a:extLst>
                   <a:ext uri="{0D108BD9-81ED-4DB2-BD59-A6C34878D82A}">
-                    <a16:rowId xmlns:a16="http://schemas.microsoft.com/office/drawing/2014/main" val="10004"/>
+                    <a16:rowId xmlns:a16="http://schemas.microsoft.com/office/drawing/2014/main" xmlns="" val="10004"/>
                   </a:ext>
                 </a:extLst>
               </a:tr>
@@ -6795,7 +6803,7 @@
           <p:cNvPr id="2" name="标题 1">
             <a:extLst>
               <a:ext uri="{FF2B5EF4-FFF2-40B4-BE49-F238E27FC236}">
-                <a16:creationId xmlns:a16="http://schemas.microsoft.com/office/drawing/2014/main" id="{0345D0D3-8342-172B-8987-4E035C3DFD36}"/>
+                <a16:creationId xmlns:a16="http://schemas.microsoft.com/office/drawing/2014/main" xmlns="" id="{0345D0D3-8342-172B-8987-4E035C3DFD36}"/>
               </a:ext>
             </a:extLst>
           </p:cNvPr>
@@ -6831,7 +6839,7 @@
           <p:cNvPr id="3" name="内容占位符 2">
             <a:extLst>
               <a:ext uri="{FF2B5EF4-FFF2-40B4-BE49-F238E27FC236}">
-                <a16:creationId xmlns:a16="http://schemas.microsoft.com/office/drawing/2014/main" id="{25032018-5836-DED0-0F04-7477AE408B3E}"/>
+                <a16:creationId xmlns:a16="http://schemas.microsoft.com/office/drawing/2014/main" xmlns="" id="{25032018-5836-DED0-0F04-7477AE408B3E}"/>
               </a:ext>
             </a:extLst>
           </p:cNvPr>
@@ -6879,7 +6887,7 @@
           <p:cNvPr id="4" name="灯片编号占位符 3">
             <a:extLst>
               <a:ext uri="{FF2B5EF4-FFF2-40B4-BE49-F238E27FC236}">
-                <a16:creationId xmlns:a16="http://schemas.microsoft.com/office/drawing/2014/main" id="{D7FA908C-7A0D-9D0A-1AF1-C4A592796725}"/>
+                <a16:creationId xmlns:a16="http://schemas.microsoft.com/office/drawing/2014/main" xmlns="" id="{D7FA908C-7A0D-9D0A-1AF1-C4A592796725}"/>
               </a:ext>
             </a:extLst>
           </p:cNvPr>
@@ -6908,7 +6916,7 @@
           <p:cNvPr id="6" name="图片 5">
             <a:extLst>
               <a:ext uri="{FF2B5EF4-FFF2-40B4-BE49-F238E27FC236}">
-                <a16:creationId xmlns:a16="http://schemas.microsoft.com/office/drawing/2014/main" id="{77E1AF1D-7D6C-C16E-69F9-D1EF3D68A350}"/>
+                <a16:creationId xmlns:a16="http://schemas.microsoft.com/office/drawing/2014/main" xmlns="" id="{77E1AF1D-7D6C-C16E-69F9-D1EF3D68A350}"/>
               </a:ext>
             </a:extLst>
           </p:cNvPr>

</xml_diff>